<commit_message>
Game win e game over com imagens na tela
</commit_message>
<xml_diff>
--- a/Cenas GA.pptx
+++ b/Cenas GA.pptx
@@ -9,6 +9,7 @@
     <p:sldId id="257" r:id="rId3"/>
     <p:sldId id="258" r:id="rId4"/>
     <p:sldId id="259" r:id="rId5"/>
+    <p:sldId id="260" r:id="rId6"/>
   </p:sldIdLst>
   <p:sldSz cx="10158413" cy="7621588"/>
   <p:notesSz cx="6858000" cy="9144000"/>
@@ -107,6 +108,11 @@
       </a:defRPr>
     </a:lvl9pPr>
   </p:defaultTextStyle>
+  <p:extLst>
+    <p:ext uri="{EFAFB233-063F-42B5-8137-9DF3F51BA10A}">
+      <p15:sldGuideLst xmlns:p15="http://schemas.microsoft.com/office/powerpoint/2012/main"/>
+    </p:ext>
+  </p:extLst>
 </p:presentation>
 </file>
 
@@ -241,7 +247,7 @@
           <a:p>
             <a:fld id="{41F7E4F1-52DA-184B-BE70-55CE4DFDF4B4}" type="datetimeFigureOut">
               <a:rPr lang="pt-BR" smtClean="0"/>
-              <a:t>13/04/2019</a:t>
+              <a:t>26/04/2019</a:t>
             </a:fld>
             <a:endParaRPr lang="pt-BR"/>
           </a:p>
@@ -411,7 +417,7 @@
           <a:p>
             <a:fld id="{41F7E4F1-52DA-184B-BE70-55CE4DFDF4B4}" type="datetimeFigureOut">
               <a:rPr lang="pt-BR" smtClean="0"/>
-              <a:t>13/04/2019</a:t>
+              <a:t>26/04/2019</a:t>
             </a:fld>
             <a:endParaRPr lang="pt-BR"/>
           </a:p>
@@ -591,7 +597,7 @@
           <a:p>
             <a:fld id="{41F7E4F1-52DA-184B-BE70-55CE4DFDF4B4}" type="datetimeFigureOut">
               <a:rPr lang="pt-BR" smtClean="0"/>
-              <a:t>13/04/2019</a:t>
+              <a:t>26/04/2019</a:t>
             </a:fld>
             <a:endParaRPr lang="pt-BR"/>
           </a:p>
@@ -761,7 +767,7 @@
           <a:p>
             <a:fld id="{41F7E4F1-52DA-184B-BE70-55CE4DFDF4B4}" type="datetimeFigureOut">
               <a:rPr lang="pt-BR" smtClean="0"/>
-              <a:t>13/04/2019</a:t>
+              <a:t>26/04/2019</a:t>
             </a:fld>
             <a:endParaRPr lang="pt-BR"/>
           </a:p>
@@ -1005,7 +1011,7 @@
           <a:p>
             <a:fld id="{41F7E4F1-52DA-184B-BE70-55CE4DFDF4B4}" type="datetimeFigureOut">
               <a:rPr lang="pt-BR" smtClean="0"/>
-              <a:t>13/04/2019</a:t>
+              <a:t>26/04/2019</a:t>
             </a:fld>
             <a:endParaRPr lang="pt-BR"/>
           </a:p>
@@ -1237,7 +1243,7 @@
           <a:p>
             <a:fld id="{41F7E4F1-52DA-184B-BE70-55CE4DFDF4B4}" type="datetimeFigureOut">
               <a:rPr lang="pt-BR" smtClean="0"/>
-              <a:t>13/04/2019</a:t>
+              <a:t>26/04/2019</a:t>
             </a:fld>
             <a:endParaRPr lang="pt-BR"/>
           </a:p>
@@ -1604,7 +1610,7 @@
           <a:p>
             <a:fld id="{41F7E4F1-52DA-184B-BE70-55CE4DFDF4B4}" type="datetimeFigureOut">
               <a:rPr lang="pt-BR" smtClean="0"/>
-              <a:t>13/04/2019</a:t>
+              <a:t>26/04/2019</a:t>
             </a:fld>
             <a:endParaRPr lang="pt-BR"/>
           </a:p>
@@ -1722,7 +1728,7 @@
           <a:p>
             <a:fld id="{41F7E4F1-52DA-184B-BE70-55CE4DFDF4B4}" type="datetimeFigureOut">
               <a:rPr lang="pt-BR" smtClean="0"/>
-              <a:t>13/04/2019</a:t>
+              <a:t>26/04/2019</a:t>
             </a:fld>
             <a:endParaRPr lang="pt-BR"/>
           </a:p>
@@ -1817,7 +1823,7 @@
           <a:p>
             <a:fld id="{41F7E4F1-52DA-184B-BE70-55CE4DFDF4B4}" type="datetimeFigureOut">
               <a:rPr lang="pt-BR" smtClean="0"/>
-              <a:t>13/04/2019</a:t>
+              <a:t>26/04/2019</a:t>
             </a:fld>
             <a:endParaRPr lang="pt-BR"/>
           </a:p>
@@ -2094,7 +2100,7 @@
           <a:p>
             <a:fld id="{41F7E4F1-52DA-184B-BE70-55CE4DFDF4B4}" type="datetimeFigureOut">
               <a:rPr lang="pt-BR" smtClean="0"/>
-              <a:t>13/04/2019</a:t>
+              <a:t>26/04/2019</a:t>
             </a:fld>
             <a:endParaRPr lang="pt-BR"/>
           </a:p>
@@ -2351,7 +2357,7 @@
           <a:p>
             <a:fld id="{41F7E4F1-52DA-184B-BE70-55CE4DFDF4B4}" type="datetimeFigureOut">
               <a:rPr lang="pt-BR" smtClean="0"/>
-              <a:t>13/04/2019</a:t>
+              <a:t>26/04/2019</a:t>
             </a:fld>
             <a:endParaRPr lang="pt-BR"/>
           </a:p>
@@ -2564,7 +2570,7 @@
           <a:p>
             <a:fld id="{41F7E4F1-52DA-184B-BE70-55CE4DFDF4B4}" type="datetimeFigureOut">
               <a:rPr lang="pt-BR" smtClean="0"/>
-              <a:t>13/04/2019</a:t>
+              <a:t>26/04/2019</a:t>
             </a:fld>
             <a:endParaRPr lang="pt-BR"/>
           </a:p>
@@ -3559,51 +3565,164 @@
           <a:chExt cx="0" cy="0"/>
         </a:xfrm>
       </p:grpSpPr>
-      <p:pic>
-        <p:nvPicPr>
-          <p:cNvPr id="3" name="Imagem 2" descr="Uma imagem contendo sala, casa de jogos, cena&#10;&#10;Descrição gerada automaticamente">
+      <p:sp>
+        <p:nvSpPr>
+          <p:cNvPr id="2" name="Retângulo 1">
             <a:extLst>
               <a:ext uri="{FF2B5EF4-FFF2-40B4-BE49-F238E27FC236}">
-                <a16:creationId xmlns:a16="http://schemas.microsoft.com/office/drawing/2014/main" id="{43963F31-35D1-9A43-ADEC-5E9754AF6780}"/>
+                <a16:creationId xmlns:a16="http://schemas.microsoft.com/office/drawing/2014/main" id="{65A1818E-DD27-1D45-BB06-10C2DE0EAA78}"/>
               </a:ext>
             </a:extLst>
           </p:cNvPr>
-          <p:cNvPicPr>
-            <a:picLocks noChangeAspect="1"/>
-          </p:cNvPicPr>
+          <p:cNvSpPr/>
           <p:nvPr/>
-        </p:nvPicPr>
-        <p:blipFill>
-          <a:blip r:embed="rId2">
-            <a:clrChange>
-              <a:clrFrom>
-                <a:srgbClr val="FFFFFF"/>
-              </a:clrFrom>
-              <a:clrTo>
-                <a:srgbClr val="FFFFFF">
-                  <a:alpha val="0"/>
-                </a:srgbClr>
-              </a:clrTo>
-            </a:clrChange>
-          </a:blip>
-          <a:stretch>
-            <a:fillRect/>
-          </a:stretch>
-        </p:blipFill>
+        </p:nvSpPr>
         <p:spPr>
           <a:xfrm>
-            <a:off x="1828006" y="5676180"/>
-            <a:ext cx="1385813" cy="1385813"/>
+            <a:off x="3392688" y="3349129"/>
+            <a:ext cx="3373039" cy="923330"/>
           </a:xfrm>
           <a:prstGeom prst="rect">
             <a:avLst/>
           </a:prstGeom>
+          <a:noFill/>
         </p:spPr>
-      </p:pic>
+        <p:txBody>
+          <a:bodyPr wrap="none" lIns="91440" tIns="45720" rIns="91440" bIns="45720">
+            <a:spAutoFit/>
+          </a:bodyPr>
+          <a:lstStyle/>
+          <a:p>
+            <a:pPr algn="ctr"/>
+            <a:r>
+              <a:rPr lang="pt-BR" sz="5400" b="0" cap="none" spc="0" dirty="0">
+                <a:ln w="0"/>
+                <a:solidFill>
+                  <a:srgbClr val="00B050"/>
+                </a:solidFill>
+                <a:effectLst>
+                  <a:reflection blurRad="6350" stA="53000" endA="300" endPos="35500" dir="5400000" sy="-90000" algn="bl" rotWithShape="0"/>
+                </a:effectLst>
+              </a:rPr>
+              <a:t>Game </a:t>
+            </a:r>
+            <a:r>
+              <a:rPr lang="pt-BR" sz="5400" dirty="0" err="1">
+                <a:ln w="0"/>
+                <a:solidFill>
+                  <a:srgbClr val="00B050"/>
+                </a:solidFill>
+                <a:effectLst>
+                  <a:reflection blurRad="6350" stA="53000" endA="300" endPos="35500" dir="5400000" sy="-90000" algn="bl" rotWithShape="0"/>
+                </a:effectLst>
+              </a:rPr>
+              <a:t>W</a:t>
+            </a:r>
+            <a:r>
+              <a:rPr lang="pt-BR" sz="5400" b="0" cap="none" spc="0" dirty="0" err="1">
+                <a:ln w="0"/>
+                <a:solidFill>
+                  <a:srgbClr val="00B050"/>
+                </a:solidFill>
+                <a:effectLst>
+                  <a:reflection blurRad="6350" stA="53000" endA="300" endPos="35500" dir="5400000" sy="-90000" algn="bl" rotWithShape="0"/>
+                </a:effectLst>
+              </a:rPr>
+              <a:t>in</a:t>
+            </a:r>
+            <a:r>
+              <a:rPr lang="pt-BR" sz="5400" b="0" cap="none" spc="0" dirty="0">
+                <a:ln w="0"/>
+                <a:solidFill>
+                  <a:srgbClr val="00B050"/>
+                </a:solidFill>
+                <a:effectLst>
+                  <a:reflection blurRad="6350" stA="53000" endA="300" endPos="35500" dir="5400000" sy="-90000" algn="bl" rotWithShape="0"/>
+                </a:effectLst>
+              </a:rPr>
+              <a:t>!</a:t>
+            </a:r>
+          </a:p>
+        </p:txBody>
+      </p:sp>
     </p:spTree>
     <p:extLst>
       <p:ext uri="{BB962C8B-B14F-4D97-AF65-F5344CB8AC3E}">
         <p14:creationId xmlns:p14="http://schemas.microsoft.com/office/powerpoint/2010/main" val="2996176136"/>
+      </p:ext>
+    </p:extLst>
+  </p:cSld>
+  <p:clrMapOvr>
+    <a:masterClrMapping/>
+  </p:clrMapOvr>
+</p:sld>
+</file>
+
+<file path=ppt/slides/slide5.xml><?xml version="1.0" encoding="utf-8"?>
+<p:sld xmlns:a="http://schemas.openxmlformats.org/drawingml/2006/main" xmlns:r="http://schemas.openxmlformats.org/officeDocument/2006/relationships" xmlns:p="http://schemas.openxmlformats.org/presentationml/2006/main">
+  <p:cSld>
+    <p:spTree>
+      <p:nvGrpSpPr>
+        <p:cNvPr id="1" name=""/>
+        <p:cNvGrpSpPr/>
+        <p:nvPr/>
+      </p:nvGrpSpPr>
+      <p:grpSpPr>
+        <a:xfrm>
+          <a:off x="0" y="0"/>
+          <a:ext cx="0" cy="0"/>
+          <a:chOff x="0" y="0"/>
+          <a:chExt cx="0" cy="0"/>
+        </a:xfrm>
+      </p:grpSpPr>
+      <p:sp>
+        <p:nvSpPr>
+          <p:cNvPr id="2" name="Retângulo 1">
+            <a:extLst>
+              <a:ext uri="{FF2B5EF4-FFF2-40B4-BE49-F238E27FC236}">
+                <a16:creationId xmlns:a16="http://schemas.microsoft.com/office/drawing/2014/main" id="{65A1818E-DD27-1D45-BB06-10C2DE0EAA78}"/>
+              </a:ext>
+            </a:extLst>
+          </p:cNvPr>
+          <p:cNvSpPr/>
+          <p:nvPr/>
+        </p:nvSpPr>
+        <p:spPr>
+          <a:xfrm>
+            <a:off x="3286248" y="3349129"/>
+            <a:ext cx="3585918" cy="923330"/>
+          </a:xfrm>
+          <a:prstGeom prst="rect">
+            <a:avLst/>
+          </a:prstGeom>
+          <a:noFill/>
+        </p:spPr>
+        <p:txBody>
+          <a:bodyPr wrap="none" lIns="91440" tIns="45720" rIns="91440" bIns="45720">
+            <a:spAutoFit/>
+          </a:bodyPr>
+          <a:lstStyle/>
+          <a:p>
+            <a:pPr algn="ctr"/>
+            <a:r>
+              <a:rPr lang="pt-BR" sz="5400" b="0" cap="none" spc="0" dirty="0">
+                <a:ln w="0"/>
+                <a:solidFill>
+                  <a:srgbClr val="FF0000"/>
+                </a:solidFill>
+                <a:effectLst>
+                  <a:reflection blurRad="6350" stA="53000" endA="300" endPos="35500" dir="5400000" sy="-90000" algn="bl" rotWithShape="0"/>
+                </a:effectLst>
+              </a:rPr>
+              <a:t>Game Over!</a:t>
+            </a:r>
+          </a:p>
+        </p:txBody>
+      </p:sp>
+    </p:spTree>
+    <p:extLst>
+      <p:ext uri="{BB962C8B-B14F-4D97-AF65-F5344CB8AC3E}">
+        <p14:creationId xmlns:p14="http://schemas.microsoft.com/office/powerpoint/2010/main" val="953730274"/>
       </p:ext>
     </p:extLst>
   </p:cSld>

</xml_diff>